<commit_message>
Update ppt for monitoring app
</commit_message>
<xml_diff>
--- a/Demo.pptx
+++ b/Demo.pptx
@@ -9,9 +9,10 @@
     <p:sldId id="258" r:id="rId3"/>
     <p:sldId id="259" r:id="rId4"/>
     <p:sldId id="260" r:id="rId5"/>
-    <p:sldId id="261" r:id="rId6"/>
-    <p:sldId id="262" r:id="rId7"/>
-    <p:sldId id="257" r:id="rId8"/>
+    <p:sldId id="263" r:id="rId6"/>
+    <p:sldId id="261" r:id="rId7"/>
+    <p:sldId id="262" r:id="rId8"/>
+    <p:sldId id="257" r:id="rId9"/>
   </p:sldIdLst>
   <p:sldSz cx="12192000" cy="6858000"/>
   <p:notesSz cx="6858000" cy="9144000"/>
@@ -4026,11 +4027,6 @@
               </a:rPr>
               <a:t>14-Feb-2017 14:45</a:t>
             </a:r>
-            <a:endParaRPr lang="en-US" dirty="0" smtClean="0">
-              <a:latin typeface="Arial Unicode MS" pitchFamily="34" charset="-128"/>
-              <a:ea typeface="Arial Unicode MS" pitchFamily="34" charset="-128"/>
-              <a:cs typeface="Arial Unicode MS" pitchFamily="34" charset="-128"/>
-            </a:endParaRPr>
           </a:p>
         </p:txBody>
       </p:sp>
@@ -4141,15 +4137,7 @@
                   <a:srgbClr val="000000"/>
                 </a:solidFill>
               </a:rPr>
-              <a:t>Project </a:t>
-            </a:r>
-            <a:r>
-              <a:rPr lang="en-US" dirty="0" smtClean="0">
-                <a:solidFill>
-                  <a:srgbClr val="000000"/>
-                </a:solidFill>
-              </a:rPr>
-              <a:t>Requirement and features</a:t>
+              <a:t>Project Requirement and features</a:t>
             </a:r>
           </a:p>
           <a:p>
@@ -4211,11 +4199,6 @@
               </a:rPr>
               <a:t>Improvements</a:t>
             </a:r>
-            <a:endParaRPr lang="en-US" dirty="0" smtClean="0">
-              <a:solidFill>
-                <a:srgbClr val="000000"/>
-              </a:solidFill>
-            </a:endParaRPr>
           </a:p>
         </p:txBody>
       </p:sp>
@@ -4315,7 +4298,6 @@
               <a:rPr lang="en-US" cap="none" dirty="0" smtClean="0"/>
               <a:t>About Me</a:t>
             </a:r>
-            <a:endParaRPr lang="en-US" cap="none" dirty="0" smtClean="0"/>
           </a:p>
         </p:txBody>
       </p:sp>
@@ -4663,12 +4645,6 @@
               </a:rPr>
               <a:t>	</a:t>
             </a:r>
-            <a:endParaRPr lang="en-US" dirty="0">
-              <a:solidFill>
-                <a:srgbClr val="000000"/>
-              </a:solidFill>
-              <a:latin typeface="Corbel" pitchFamily="34" charset="0"/>
-            </a:endParaRPr>
           </a:p>
           <a:p>
             <a:pPr marL="419100" indent="-419100">
@@ -4896,7 +4872,6 @@
               <a:rPr lang="en-US" cap="none" dirty="0" smtClean="0"/>
               <a:t>Project Requirement</a:t>
             </a:r>
-            <a:endParaRPr lang="en-US" cap="none" dirty="0" smtClean="0"/>
           </a:p>
         </p:txBody>
       </p:sp>
@@ -4969,16 +4944,7 @@
                 </a:solidFill>
                 <a:latin typeface="Corbel" pitchFamily="34" charset="0"/>
               </a:rPr>
-              <a:t> application on AWS. </a:t>
-            </a:r>
-            <a:r>
-              <a:rPr lang="en-US" dirty="0" smtClean="0">
-                <a:solidFill>
-                  <a:srgbClr val="000000"/>
-                </a:solidFill>
-                <a:latin typeface="Corbel" pitchFamily="34" charset="0"/>
-              </a:rPr>
-              <a:t>  </a:t>
+              <a:t> application on AWS.   </a:t>
             </a:r>
             <a:r>
               <a:rPr lang="en-US" dirty="0" err="1" smtClean="0">
@@ -5032,8 +4998,108 @@
                 </a:solidFill>
                 <a:latin typeface="Corbel" pitchFamily="34" charset="0"/>
               </a:rPr>
-              <a:t>The deployment architecture should be Highly Available, Scalable, Secure, Cost Effective and easy to monitor</a:t>
-            </a:r>
+              <a:t>The deployment architecture should be Highly Available, Scalable, Secure, Cost Effective and easy to </a:t>
+            </a:r>
+            <a:r>
+              <a:rPr lang="en-US" dirty="0" smtClean="0">
+                <a:solidFill>
+                  <a:srgbClr val="000000"/>
+                </a:solidFill>
+                <a:latin typeface="Corbel" pitchFamily="34" charset="0"/>
+              </a:rPr>
+              <a:t>monitor</a:t>
+            </a:r>
+          </a:p>
+          <a:p>
+            <a:pPr marL="419100" indent="-419100">
+              <a:lnSpc>
+                <a:spcPct val="80000"/>
+              </a:lnSpc>
+              <a:spcBef>
+                <a:spcPts val="1200"/>
+              </a:spcBef>
+              <a:spcAft>
+                <a:spcPts val="200"/>
+              </a:spcAft>
+              <a:buClr>
+                <a:schemeClr val="tx1"/>
+              </a:buClr>
+              <a:buFont typeface="Wingdings" pitchFamily="2" charset="2"/>
+              <a:buAutoNum type="arabicPeriod"/>
+            </a:pPr>
+            <a:r>
+              <a:rPr lang="en-US" dirty="0" smtClean="0">
+                <a:solidFill>
+                  <a:srgbClr val="000000"/>
+                </a:solidFill>
+                <a:latin typeface="Corbel" pitchFamily="34" charset="0"/>
+              </a:rPr>
+              <a:t>Create a monitor application for monitoring running of the deployed </a:t>
+            </a:r>
+            <a:r>
+              <a:rPr lang="en-US" dirty="0" err="1" smtClean="0">
+                <a:solidFill>
+                  <a:srgbClr val="000000"/>
+                </a:solidFill>
+                <a:latin typeface="Corbel" pitchFamily="34" charset="0"/>
+              </a:rPr>
+              <a:t>mybb</a:t>
+            </a:r>
+            <a:r>
+              <a:rPr lang="en-US" dirty="0" smtClean="0">
+                <a:solidFill>
+                  <a:srgbClr val="000000"/>
+                </a:solidFill>
+                <a:latin typeface="Corbel" pitchFamily="34" charset="0"/>
+              </a:rPr>
+              <a:t> stacks. </a:t>
+            </a:r>
+            <a:endParaRPr lang="en-US" dirty="0">
+              <a:solidFill>
+                <a:srgbClr val="000000"/>
+              </a:solidFill>
+              <a:latin typeface="Corbel" pitchFamily="34" charset="0"/>
+            </a:endParaRPr>
+          </a:p>
+          <a:p>
+            <a:pPr>
+              <a:lnSpc>
+                <a:spcPct val="80000"/>
+              </a:lnSpc>
+              <a:spcBef>
+                <a:spcPts val="1200"/>
+              </a:spcBef>
+              <a:spcAft>
+                <a:spcPts val="200"/>
+              </a:spcAft>
+              <a:buClr>
+                <a:schemeClr val="tx1"/>
+              </a:buClr>
+            </a:pPr>
+            <a:r>
+              <a:rPr lang="en-US" dirty="0" smtClean="0">
+                <a:solidFill>
+                  <a:srgbClr val="000000"/>
+                </a:solidFill>
+                <a:latin typeface="Corbel" pitchFamily="34" charset="0"/>
+              </a:rPr>
+              <a:t>          This is </a:t>
+            </a:r>
+            <a:r>
+              <a:rPr lang="en-US" dirty="0" smtClean="0">
+                <a:solidFill>
+                  <a:srgbClr val="000000"/>
+                </a:solidFill>
+                <a:latin typeface="Corbel" pitchFamily="34" charset="0"/>
+              </a:rPr>
+              <a:t>30% completed as of now. I still have 3-4 hours. Let see if I can do it till then.</a:t>
+            </a:r>
+            <a:endParaRPr lang="en-US" dirty="0" smtClean="0">
+              <a:solidFill>
+                <a:srgbClr val="000000"/>
+              </a:solidFill>
+              <a:latin typeface="Corbel" pitchFamily="34" charset="0"/>
+            </a:endParaRPr>
           </a:p>
           <a:p>
             <a:pPr marL="419100" indent="-419100">
@@ -5346,9 +5412,102 @@
             <a:pPr eaLnBrk="1" hangingPunct="1"/>
             <a:r>
               <a:rPr lang="en-US" cap="none" dirty="0" smtClean="0"/>
+              <a:t>Monitoring app</a:t>
+            </a:r>
+            <a:endParaRPr lang="en-US" cap="none" dirty="0" smtClean="0"/>
+          </a:p>
+        </p:txBody>
+      </p:sp>
+      <p:pic>
+        <p:nvPicPr>
+          <p:cNvPr id="3" name="Picture 2"/>
+          <p:cNvPicPr>
+            <a:picLocks noChangeAspect="1"/>
+          </p:cNvPicPr>
+          <p:nvPr/>
+        </p:nvPicPr>
+        <p:blipFill>
+          <a:blip r:embed="rId2"/>
+          <a:stretch>
+            <a:fillRect/>
+          </a:stretch>
+        </p:blipFill>
+        <p:spPr>
+          <a:xfrm>
+            <a:off x="189896" y="1971675"/>
+            <a:ext cx="11039475" cy="4886325"/>
+          </a:xfrm>
+          <a:prstGeom prst="rect">
+            <a:avLst/>
+          </a:prstGeom>
+        </p:spPr>
+      </p:pic>
+    </p:spTree>
+    <p:extLst>
+      <p:ext uri="{BB962C8B-B14F-4D97-AF65-F5344CB8AC3E}">
+        <p14:creationId xmlns:p14="http://schemas.microsoft.com/office/powerpoint/2010/main" val="2531534291"/>
+      </p:ext>
+    </p:extLst>
+  </p:cSld>
+  <p:clrMapOvr>
+    <a:masterClrMapping/>
+  </p:clrMapOvr>
+  <p:timing>
+    <p:tnLst>
+      <p:par>
+        <p:cTn id="1" dur="indefinite" restart="never" nodeType="tmRoot"/>
+      </p:par>
+    </p:tnLst>
+  </p:timing>
+</p:sld>
+</file>
+
+<file path=ppt/slides/slide6.xml><?xml version="1.0" encoding="utf-8"?>
+<p:sld xmlns:a="http://schemas.openxmlformats.org/drawingml/2006/main" xmlns:r="http://schemas.openxmlformats.org/officeDocument/2006/relationships" xmlns:p="http://schemas.openxmlformats.org/presentationml/2006/main">
+  <p:cSld>
+    <p:spTree>
+      <p:nvGrpSpPr>
+        <p:cNvPr id="1" name=""/>
+        <p:cNvGrpSpPr/>
+        <p:nvPr/>
+      </p:nvGrpSpPr>
+      <p:grpSpPr>
+        <a:xfrm>
+          <a:off x="0" y="0"/>
+          <a:ext cx="0" cy="0"/>
+          <a:chOff x="0" y="0"/>
+          <a:chExt cx="0" cy="0"/>
+        </a:xfrm>
+      </p:grpSpPr>
+      <p:sp>
+        <p:nvSpPr>
+          <p:cNvPr id="16386" name="Title 1"/>
+          <p:cNvSpPr>
+            <a:spLocks noGrp="1"/>
+          </p:cNvSpPr>
+          <p:nvPr>
+            <p:ph type="title"/>
+          </p:nvPr>
+        </p:nvSpPr>
+        <p:spPr bwMode="auto">
+          <a:xfrm>
+            <a:off x="403225" y="271463"/>
+            <a:ext cx="9783763" cy="1508125"/>
+          </a:xfrm>
+        </p:spPr>
+        <p:txBody>
+          <a:bodyPr wrap="square" numCol="1" anchorCtr="0" compatLnSpc="1">
+            <a:prstTxWarp prst="textNoShape">
+              <a:avLst/>
+            </a:prstTxWarp>
+          </a:bodyPr>
+          <a:lstStyle/>
+          <a:p>
+            <a:pPr eaLnBrk="1" hangingPunct="1"/>
+            <a:r>
+              <a:rPr lang="en-US" cap="none" dirty="0" smtClean="0"/>
               <a:t>Architecture</a:t>
             </a:r>
-            <a:endParaRPr lang="en-US" cap="none" dirty="0" smtClean="0"/>
           </a:p>
         </p:txBody>
       </p:sp>
@@ -5610,7 +5769,7 @@
 </p:sld>
 </file>
 
-<file path=ppt/slides/slide6.xml><?xml version="1.0" encoding="utf-8"?>
+<file path=ppt/slides/slide7.xml><?xml version="1.0" encoding="utf-8"?>
 <p:sld xmlns:a="http://schemas.openxmlformats.org/drawingml/2006/main" xmlns:r="http://schemas.openxmlformats.org/officeDocument/2006/relationships" xmlns:p="http://schemas.openxmlformats.org/presentationml/2006/main">
   <p:cSld>
     <p:spTree>
@@ -5656,7 +5815,6 @@
               <a:rPr lang="en-US" cap="none" dirty="0" smtClean="0"/>
               <a:t>Improvements</a:t>
             </a:r>
-            <a:endParaRPr lang="en-US" cap="none" dirty="0" smtClean="0"/>
           </a:p>
         </p:txBody>
       </p:sp>
@@ -5884,16 +6042,7 @@
                 </a:solidFill>
                 <a:latin typeface="Corbel" pitchFamily="34" charset="0"/>
               </a:rPr>
-              <a:t>. </a:t>
-            </a:r>
-            <a:r>
-              <a:rPr lang="en-US" dirty="0">
-                <a:solidFill>
-                  <a:srgbClr val="000000"/>
-                </a:solidFill>
-                <a:latin typeface="Corbel" pitchFamily="34" charset="0"/>
-              </a:rPr>
-              <a:t>and taking domain name from user</a:t>
+              <a:t>. and taking domain name from user</a:t>
             </a:r>
           </a:p>
           <a:p>
@@ -6058,7 +6207,7 @@
 </p:sld>
 </file>
 
-<file path=ppt/slides/slide7.xml><?xml version="1.0" encoding="utf-8"?>
+<file path=ppt/slides/slide8.xml><?xml version="1.0" encoding="utf-8"?>
 <p:sld xmlns:a="http://schemas.openxmlformats.org/drawingml/2006/main" xmlns:r="http://schemas.openxmlformats.org/officeDocument/2006/relationships" xmlns:p="http://schemas.openxmlformats.org/presentationml/2006/main">
   <p:cSld>
     <p:bg>

</xml_diff>

<commit_message>
Add vidoe link file
</commit_message>
<xml_diff>
--- a/Demo.pptx
+++ b/Demo.pptx
@@ -4998,16 +4998,7 @@
                 </a:solidFill>
                 <a:latin typeface="Corbel" pitchFamily="34" charset="0"/>
               </a:rPr>
-              <a:t>The deployment architecture should be Highly Available, Scalable, Secure, Cost Effective and easy to </a:t>
-            </a:r>
-            <a:r>
-              <a:rPr lang="en-US" dirty="0" smtClean="0">
-                <a:solidFill>
-                  <a:srgbClr val="000000"/>
-                </a:solidFill>
-                <a:latin typeface="Corbel" pitchFamily="34" charset="0"/>
-              </a:rPr>
-              <a:t>monitor</a:t>
+              <a:t>The deployment architecture should be Highly Available, Scalable, Secure, Cost Effective and easy to monitor</a:t>
             </a:r>
           </a:p>
           <a:p>
@@ -5083,23 +5074,8 @@
                 </a:solidFill>
                 <a:latin typeface="Corbel" pitchFamily="34" charset="0"/>
               </a:rPr>
-              <a:t>          This is </a:t>
-            </a:r>
-            <a:r>
-              <a:rPr lang="en-US" dirty="0" smtClean="0">
-                <a:solidFill>
-                  <a:srgbClr val="000000"/>
-                </a:solidFill>
-                <a:latin typeface="Corbel" pitchFamily="34" charset="0"/>
-              </a:rPr>
-              <a:t>30% completed as of now. I still have 3-4 hours. Let see if I can do it till then.</a:t>
-            </a:r>
-            <a:endParaRPr lang="en-US" dirty="0" smtClean="0">
-              <a:solidFill>
-                <a:srgbClr val="000000"/>
-              </a:solidFill>
-              <a:latin typeface="Corbel" pitchFamily="34" charset="0"/>
-            </a:endParaRPr>
+              <a:t>          This is 30% completed as of now. I still have 3-4 hours. Let see if I can do it till then.</a:t>
+            </a:r>
           </a:p>
           <a:p>
             <a:pPr marL="419100" indent="-419100">
@@ -5414,7 +5390,6 @@
               <a:rPr lang="en-US" cap="none" dirty="0" smtClean="0"/>
               <a:t>Monitoring app</a:t>
             </a:r>
-            <a:endParaRPr lang="en-US" cap="none" dirty="0" smtClean="0"/>
           </a:p>
         </p:txBody>
       </p:sp>
@@ -5828,8 +5803,8 @@
         </p:nvSpPr>
         <p:spPr bwMode="auto">
           <a:xfrm>
-            <a:off x="381000" y="1955800"/>
-            <a:ext cx="9601200" cy="4032876"/>
+            <a:off x="381000" y="1955799"/>
+            <a:ext cx="9601200" cy="4457879"/>
           </a:xfrm>
           <a:prstGeom prst="rect">
             <a:avLst/>
@@ -6018,13 +5993,22 @@
               <a:t>1</a:t>
             </a:r>
             <a:r>
-              <a:rPr lang="en-US" dirty="0">
+              <a:rPr lang="en-US" dirty="0" smtClean="0">
                 <a:solidFill>
                   <a:srgbClr val="000000"/>
                 </a:solidFill>
                 <a:latin typeface="Corbel" pitchFamily="34" charset="0"/>
               </a:rPr>
-              <a:t>) Enable global high availability by using hosted zone’s routing policies like Failover and </a:t>
+              <a:t>) Enable </a:t>
+            </a:r>
+            <a:r>
+              <a:rPr lang="en-US" dirty="0">
+                <a:solidFill>
+                  <a:srgbClr val="000000"/>
+                </a:solidFill>
+                <a:latin typeface="Corbel" pitchFamily="34" charset="0"/>
+              </a:rPr>
+              <a:t>global high availability by using hosted zone’s routing policies like Failover and </a:t>
             </a:r>
             <a:r>
               <a:rPr lang="en-US" dirty="0" smtClean="0">
@@ -6042,7 +6026,16 @@
                 </a:solidFill>
                 <a:latin typeface="Corbel" pitchFamily="34" charset="0"/>
               </a:rPr>
-              <a:t>. and taking domain name from user</a:t>
+              <a:t>. and taking domain name from </a:t>
+            </a:r>
+            <a:r>
+              <a:rPr lang="en-US" dirty="0" smtClean="0">
+                <a:solidFill>
+                  <a:srgbClr val="000000"/>
+                </a:solidFill>
+                <a:latin typeface="Corbel" pitchFamily="34" charset="0"/>
+              </a:rPr>
+              <a:t>user</a:t>
             </a:r>
           </a:p>
           <a:p>
@@ -6062,10 +6055,11 @@
               <a:buFont typeface="Wingdings" pitchFamily="2" charset="2"/>
               <a:buNone/>
             </a:pPr>
-            <a:endParaRPr lang="en-US" dirty="0" smtClean="0">
+            <a:endParaRPr lang="en-US" dirty="0">
               <a:solidFill>
                 <a:srgbClr val="000000"/>
               </a:solidFill>
+              <a:latin typeface="Corbel" pitchFamily="34" charset="0"/>
             </a:endParaRPr>
           </a:p>
           <a:p>
@@ -6090,6 +6084,131 @@
                 <a:srgbClr val="000000"/>
               </a:solidFill>
             </a:endParaRPr>
+          </a:p>
+          <a:p>
+            <a:pPr marL="419100" indent="-419100">
+              <a:lnSpc>
+                <a:spcPct val="80000"/>
+              </a:lnSpc>
+              <a:spcBef>
+                <a:spcPts val="1200"/>
+              </a:spcBef>
+              <a:spcAft>
+                <a:spcPts val="200"/>
+              </a:spcAft>
+              <a:buClr>
+                <a:schemeClr val="tx1"/>
+              </a:buClr>
+              <a:buFont typeface="Wingdings" pitchFamily="2" charset="2"/>
+              <a:buNone/>
+            </a:pPr>
+            <a:r>
+              <a:rPr lang="en-US" dirty="0" smtClean="0">
+                <a:solidFill>
+                  <a:srgbClr val="000000"/>
+                </a:solidFill>
+              </a:rPr>
+              <a:t>Speed </a:t>
+            </a:r>
+          </a:p>
+          <a:p>
+            <a:pPr marL="419100" indent="-419100">
+              <a:lnSpc>
+                <a:spcPct val="80000"/>
+              </a:lnSpc>
+              <a:spcBef>
+                <a:spcPts val="1200"/>
+              </a:spcBef>
+              <a:spcAft>
+                <a:spcPts val="200"/>
+              </a:spcAft>
+              <a:buClr>
+                <a:schemeClr val="tx1"/>
+              </a:buClr>
+              <a:buFont typeface="Wingdings" pitchFamily="2" charset="2"/>
+              <a:buNone/>
+            </a:pPr>
+            <a:r>
+              <a:rPr lang="en-US" dirty="0">
+                <a:solidFill>
+                  <a:srgbClr val="000000"/>
+                </a:solidFill>
+                <a:latin typeface="Corbel" pitchFamily="34" charset="0"/>
+              </a:rPr>
+              <a:t>Instead of installing </a:t>
+            </a:r>
+            <a:r>
+              <a:rPr lang="en-US" dirty="0" err="1">
+                <a:solidFill>
+                  <a:srgbClr val="000000"/>
+                </a:solidFill>
+                <a:latin typeface="Corbel" pitchFamily="34" charset="0"/>
+              </a:rPr>
+              <a:t>MyBB</a:t>
+            </a:r>
+            <a:r>
+              <a:rPr lang="en-US" dirty="0">
+                <a:solidFill>
+                  <a:srgbClr val="000000"/>
+                </a:solidFill>
+                <a:latin typeface="Corbel" pitchFamily="34" charset="0"/>
+              </a:rPr>
+              <a:t> application and </a:t>
+            </a:r>
+            <a:r>
+              <a:rPr lang="en-US" dirty="0" err="1">
+                <a:solidFill>
+                  <a:srgbClr val="000000"/>
+                </a:solidFill>
+                <a:latin typeface="Corbel" pitchFamily="34" charset="0"/>
+              </a:rPr>
+              <a:t>depencies</a:t>
+            </a:r>
+            <a:r>
+              <a:rPr lang="en-US" dirty="0">
+                <a:solidFill>
+                  <a:srgbClr val="000000"/>
+                </a:solidFill>
+                <a:latin typeface="Corbel" pitchFamily="34" charset="0"/>
+              </a:rPr>
+              <a:t> during instance first </a:t>
+            </a:r>
+            <a:r>
+              <a:rPr lang="en-US" dirty="0" err="1">
+                <a:solidFill>
+                  <a:srgbClr val="000000"/>
+                </a:solidFill>
+                <a:latin typeface="Corbel" pitchFamily="34" charset="0"/>
+              </a:rPr>
+              <a:t>boont</a:t>
+            </a:r>
+            <a:r>
+              <a:rPr lang="en-US" dirty="0">
+                <a:solidFill>
+                  <a:srgbClr val="000000"/>
+                </a:solidFill>
+                <a:latin typeface="Corbel" pitchFamily="34" charset="0"/>
+              </a:rPr>
+              <a:t> or launch configuration, create AMI’s for application and launch instance from that AMI in </a:t>
+            </a:r>
+            <a:r>
+              <a:rPr lang="en-US" dirty="0" err="1">
+                <a:solidFill>
+                  <a:srgbClr val="000000"/>
+                </a:solidFill>
+                <a:latin typeface="Corbel" pitchFamily="34" charset="0"/>
+              </a:rPr>
+              <a:t>autoscaling</a:t>
+            </a:r>
+            <a:r>
+              <a:rPr lang="en-US" dirty="0">
+                <a:solidFill>
+                  <a:srgbClr val="000000"/>
+                </a:solidFill>
+                <a:latin typeface="Corbel" pitchFamily="34" charset="0"/>
+              </a:rPr>
+              <a:t>.</a:t>
+            </a:r>
           </a:p>
           <a:p>
             <a:pPr marL="419100" indent="-419100">

</xml_diff>